<commit_message>
P8 STATESPACE MATCHES P8 SFG
</commit_message>
<xml_diff>
--- a/p6_illustration.pptx
+++ b/p6_illustration.pptx
@@ -7,6 +7,7 @@
   <p:sldIdLst>
     <p:sldId id="256" r:id="rId2"/>
     <p:sldId id="257" r:id="rId3"/>
+    <p:sldId id="258" r:id="rId4"/>
   </p:sldIdLst>
   <p:sldSz cx="12192000" cy="6858000"/>
   <p:notesSz cx="6858000" cy="9144000"/>
@@ -105,6 +106,11 @@
       </a:defRPr>
     </a:lvl9pPr>
   </p:defaultTextStyle>
+  <p:extLst>
+    <p:ext uri="{EFAFB233-063F-42B5-8137-9DF3F51BA10A}">
+      <p15:sldGuideLst xmlns:p15="http://schemas.microsoft.com/office/powerpoint/2012/main"/>
+    </p:ext>
+  </p:extLst>
 </p:presentation>
 </file>
 
@@ -255,7 +261,7 @@
           <a:p>
             <a:fld id="{692716C1-FF20-4CF2-9B49-ECB4A595E322}" type="datetimeFigureOut">
               <a:rPr lang="en-US" smtClean="0"/>
-              <a:t>11/3/2018</a:t>
+              <a:t>11/5/2018</a:t>
             </a:fld>
             <a:endParaRPr lang="en-US"/>
           </a:p>
@@ -453,7 +459,7 @@
           <a:p>
             <a:fld id="{692716C1-FF20-4CF2-9B49-ECB4A595E322}" type="datetimeFigureOut">
               <a:rPr lang="en-US" smtClean="0"/>
-              <a:t>11/3/2018</a:t>
+              <a:t>11/5/2018</a:t>
             </a:fld>
             <a:endParaRPr lang="en-US"/>
           </a:p>
@@ -661,7 +667,7 @@
           <a:p>
             <a:fld id="{692716C1-FF20-4CF2-9B49-ECB4A595E322}" type="datetimeFigureOut">
               <a:rPr lang="en-US" smtClean="0"/>
-              <a:t>11/3/2018</a:t>
+              <a:t>11/5/2018</a:t>
             </a:fld>
             <a:endParaRPr lang="en-US"/>
           </a:p>
@@ -859,7 +865,7 @@
           <a:p>
             <a:fld id="{692716C1-FF20-4CF2-9B49-ECB4A595E322}" type="datetimeFigureOut">
               <a:rPr lang="en-US" smtClean="0"/>
-              <a:t>11/3/2018</a:t>
+              <a:t>11/5/2018</a:t>
             </a:fld>
             <a:endParaRPr lang="en-US"/>
           </a:p>
@@ -1134,7 +1140,7 @@
           <a:p>
             <a:fld id="{692716C1-FF20-4CF2-9B49-ECB4A595E322}" type="datetimeFigureOut">
               <a:rPr lang="en-US" smtClean="0"/>
-              <a:t>11/3/2018</a:t>
+              <a:t>11/5/2018</a:t>
             </a:fld>
             <a:endParaRPr lang="en-US"/>
           </a:p>
@@ -1399,7 +1405,7 @@
           <a:p>
             <a:fld id="{692716C1-FF20-4CF2-9B49-ECB4A595E322}" type="datetimeFigureOut">
               <a:rPr lang="en-US" smtClean="0"/>
-              <a:t>11/3/2018</a:t>
+              <a:t>11/5/2018</a:t>
             </a:fld>
             <a:endParaRPr lang="en-US"/>
           </a:p>
@@ -1811,7 +1817,7 @@
           <a:p>
             <a:fld id="{692716C1-FF20-4CF2-9B49-ECB4A595E322}" type="datetimeFigureOut">
               <a:rPr lang="en-US" smtClean="0"/>
-              <a:t>11/3/2018</a:t>
+              <a:t>11/5/2018</a:t>
             </a:fld>
             <a:endParaRPr lang="en-US"/>
           </a:p>
@@ -1952,7 +1958,7 @@
           <a:p>
             <a:fld id="{692716C1-FF20-4CF2-9B49-ECB4A595E322}" type="datetimeFigureOut">
               <a:rPr lang="en-US" smtClean="0"/>
-              <a:t>11/3/2018</a:t>
+              <a:t>11/5/2018</a:t>
             </a:fld>
             <a:endParaRPr lang="en-US"/>
           </a:p>
@@ -2065,7 +2071,7 @@
           <a:p>
             <a:fld id="{692716C1-FF20-4CF2-9B49-ECB4A595E322}" type="datetimeFigureOut">
               <a:rPr lang="en-US" smtClean="0"/>
-              <a:t>11/3/2018</a:t>
+              <a:t>11/5/2018</a:t>
             </a:fld>
             <a:endParaRPr lang="en-US"/>
           </a:p>
@@ -2376,7 +2382,7 @@
           <a:p>
             <a:fld id="{692716C1-FF20-4CF2-9B49-ECB4A595E322}" type="datetimeFigureOut">
               <a:rPr lang="en-US" smtClean="0"/>
-              <a:t>11/3/2018</a:t>
+              <a:t>11/5/2018</a:t>
             </a:fld>
             <a:endParaRPr lang="en-US"/>
           </a:p>
@@ -2664,7 +2670,7 @@
           <a:p>
             <a:fld id="{692716C1-FF20-4CF2-9B49-ECB4A595E322}" type="datetimeFigureOut">
               <a:rPr lang="en-US" smtClean="0"/>
-              <a:t>11/3/2018</a:t>
+              <a:t>11/5/2018</a:t>
             </a:fld>
             <a:endParaRPr lang="en-US"/>
           </a:p>
@@ -2905,7 +2911,7 @@
           <a:p>
             <a:fld id="{692716C1-FF20-4CF2-9B49-ECB4A595E322}" type="datetimeFigureOut">
               <a:rPr lang="en-US" smtClean="0"/>
-              <a:t>11/3/2018</a:t>
+              <a:t>11/5/2018</a:t>
             </a:fld>
             <a:endParaRPr lang="en-US"/>
           </a:p>
@@ -3336,7 +3342,7 @@
         </p:nvSpPr>
         <p:spPr>
           <a:xfrm>
-            <a:off x="1069571" y="779318"/>
+            <a:off x="2898371" y="825038"/>
             <a:ext cx="2683823" cy="1200329"/>
           </a:xfrm>
           <a:prstGeom prst="rect">
@@ -3383,7 +3389,7 @@
         </p:nvCxnSpPr>
         <p:spPr>
           <a:xfrm>
-            <a:off x="2411483" y="1979647"/>
+            <a:off x="4240283" y="2025367"/>
             <a:ext cx="0" cy="646331"/>
           </a:xfrm>
           <a:prstGeom prst="straightConnector1">
@@ -3427,7 +3433,7 @@
             </p:nvSpPr>
             <p:spPr>
               <a:xfrm>
-                <a:off x="1069571" y="2625978"/>
+                <a:off x="2898371" y="2671698"/>
                 <a:ext cx="2683823" cy="1200329"/>
               </a:xfrm>
               <a:prstGeom prst="rect">
@@ -3560,6 +3566,868 @@
             </p:nvSpPr>
             <p:spPr>
               <a:xfrm>
+                <a:off x="2898371" y="2671698"/>
+                <a:ext cx="2683823" cy="1200329"/>
+              </a:xfrm>
+              <a:prstGeom prst="rect">
+                <a:avLst/>
+              </a:prstGeom>
+              <a:blipFill>
+                <a:blip r:embed="rId2"/>
+                <a:stretch>
+                  <a:fillRect t="-2010" r="-1354" b="-6533"/>
+                </a:stretch>
+              </a:blipFill>
+              <a:ln>
+                <a:solidFill>
+                  <a:schemeClr val="tx1">
+                    <a:lumMod val="95000"/>
+                    <a:lumOff val="5000"/>
+                  </a:schemeClr>
+                </a:solidFill>
+              </a:ln>
+            </p:spPr>
+            <p:txBody>
+              <a:bodyPr/>
+              <a:lstStyle/>
+              <a:p>
+                <a:r>
+                  <a:rPr lang="en-US">
+                    <a:noFill/>
+                  </a:rPr>
+                  <a:t> </a:t>
+                </a:r>
+              </a:p>
+            </p:txBody>
+          </p:sp>
+        </mc:Fallback>
+      </mc:AlternateContent>
+      <p:cxnSp>
+        <p:nvCxnSpPr>
+          <p:cNvPr id="9" name="Straight Arrow Connector 8">
+            <a:extLst>
+              <a:ext uri="{FF2B5EF4-FFF2-40B4-BE49-F238E27FC236}">
+                <a16:creationId xmlns:a16="http://schemas.microsoft.com/office/drawing/2014/main" id="{8D502F91-F651-4B9D-83F0-83F548D0CA40}"/>
+              </a:ext>
+            </a:extLst>
+          </p:cNvPr>
+          <p:cNvCxnSpPr>
+            <a:cxnSpLocks/>
+            <a:stCxn id="8" idx="2"/>
+          </p:cNvCxnSpPr>
+          <p:nvPr/>
+        </p:nvCxnSpPr>
+        <p:spPr>
+          <a:xfrm>
+            <a:off x="4240283" y="3872027"/>
+            <a:ext cx="0" cy="646331"/>
+          </a:xfrm>
+          <a:prstGeom prst="straightConnector1">
+            <a:avLst/>
+          </a:prstGeom>
+          <a:ln>
+            <a:solidFill>
+              <a:schemeClr val="tx1"/>
+            </a:solidFill>
+            <a:tailEnd type="triangle"/>
+          </a:ln>
+        </p:spPr>
+        <p:style>
+          <a:lnRef idx="1">
+            <a:schemeClr val="accent1"/>
+          </a:lnRef>
+          <a:fillRef idx="0">
+            <a:schemeClr val="accent1"/>
+          </a:fillRef>
+          <a:effectRef idx="0">
+            <a:schemeClr val="accent1"/>
+          </a:effectRef>
+          <a:fontRef idx="minor">
+            <a:schemeClr val="tx1"/>
+          </a:fontRef>
+        </p:style>
+      </p:cxnSp>
+      <p:sp>
+        <p:nvSpPr>
+          <p:cNvPr id="10" name="TextBox 9">
+            <a:extLst>
+              <a:ext uri="{FF2B5EF4-FFF2-40B4-BE49-F238E27FC236}">
+                <a16:creationId xmlns:a16="http://schemas.microsoft.com/office/drawing/2014/main" id="{1A6E9B4C-749E-4F03-8F85-EC5A7A54EAED}"/>
+              </a:ext>
+            </a:extLst>
+          </p:cNvPr>
+          <p:cNvSpPr txBox="1"/>
+          <p:nvPr/>
+        </p:nvSpPr>
+        <p:spPr>
+          <a:xfrm>
+            <a:off x="2898371" y="4518358"/>
+            <a:ext cx="2683823" cy="1477328"/>
+          </a:xfrm>
+          <a:prstGeom prst="rect">
+            <a:avLst/>
+          </a:prstGeom>
+          <a:noFill/>
+          <a:ln>
+            <a:solidFill>
+              <a:schemeClr val="tx1">
+                <a:lumMod val="95000"/>
+                <a:lumOff val="5000"/>
+              </a:schemeClr>
+            </a:solidFill>
+          </a:ln>
+        </p:spPr>
+        <p:txBody>
+          <a:bodyPr wrap="square" rtlCol="0">
+            <a:spAutoFit/>
+          </a:bodyPr>
+          <a:lstStyle/>
+          <a:p>
+            <a:pPr algn="ctr"/>
+            <a:r>
+              <a:rPr lang="en-US" dirty="0"/>
+              <a:t>Multiply the UPR and signal transforms to get the transform of both outputs</a:t>
+            </a:r>
+          </a:p>
+          <a:p>
+            <a:pPr algn="ctr"/>
+            <a:r>
+              <a:rPr lang="en-US" dirty="0"/>
+              <a:t>(2N MACs)</a:t>
+            </a:r>
+          </a:p>
+        </p:txBody>
+      </p:sp>
+      <mc:AlternateContent xmlns:mc="http://schemas.openxmlformats.org/markup-compatibility/2006">
+        <mc:Choice xmlns:a14="http://schemas.microsoft.com/office/drawing/2010/main" Requires="a14">
+          <p:sp>
+            <p:nvSpPr>
+              <p:cNvPr id="25" name="TextBox 24">
+                <a:extLst>
+                  <a:ext uri="{FF2B5EF4-FFF2-40B4-BE49-F238E27FC236}">
+                    <a16:creationId xmlns:a16="http://schemas.microsoft.com/office/drawing/2014/main" id="{50CC3851-CEBC-46A2-AB96-7D8DF5AA27E3}"/>
+                  </a:ext>
+                </a:extLst>
+              </p:cNvPr>
+              <p:cNvSpPr txBox="1"/>
+              <p:nvPr/>
+            </p:nvSpPr>
+            <p:spPr>
+              <a:xfrm>
+                <a:off x="6571211" y="963537"/>
+                <a:ext cx="2683823" cy="1200329"/>
+              </a:xfrm>
+              <a:prstGeom prst="rect">
+                <a:avLst/>
+              </a:prstGeom>
+              <a:noFill/>
+              <a:ln>
+                <a:solidFill>
+                  <a:schemeClr val="tx1">
+                    <a:lumMod val="95000"/>
+                    <a:lumOff val="5000"/>
+                  </a:schemeClr>
+                </a:solidFill>
+              </a:ln>
+            </p:spPr>
+            <p:txBody>
+              <a:bodyPr wrap="square" rtlCol="0">
+                <a:spAutoFit/>
+              </a:bodyPr>
+              <a:lstStyle/>
+              <a:p>
+                <a:pPr algn="ctr"/>
+                <a:r>
+                  <a:rPr lang="en-US" dirty="0"/>
+                  <a:t>Process the IFFT of the combined y transforms as complex input</a:t>
+                </a:r>
+              </a:p>
+              <a:p>
+                <a:pPr algn="ctr"/>
+                <a:r>
+                  <a:rPr lang="en-US" dirty="0"/>
+                  <a:t>(</a:t>
+                </a:r>
+                <a14:m>
+                  <m:oMath xmlns:m="http://schemas.openxmlformats.org/officeDocument/2006/math">
+                    <m:r>
+                      <a:rPr lang="en-US" i="1">
+                        <a:latin typeface="Cambria Math" panose="02040503050406030204" pitchFamily="18" charset="0"/>
+                      </a:rPr>
+                      <m:t>2</m:t>
+                    </m:r>
+                    <m:r>
+                      <a:rPr lang="en-US" i="1">
+                        <a:latin typeface="Cambria Math" panose="02040503050406030204" pitchFamily="18" charset="0"/>
+                      </a:rPr>
+                      <m:t>𝑁</m:t>
+                    </m:r>
+                    <m:r>
+                      <a:rPr lang="en-US" i="1">
+                        <a:latin typeface="Cambria Math" panose="02040503050406030204" pitchFamily="18" charset="0"/>
+                      </a:rPr>
+                      <m:t>[</m:t>
+                    </m:r>
+                    <m:func>
+                      <m:funcPr>
+                        <m:ctrlPr>
+                          <a:rPr lang="en-US" i="1">
+                            <a:latin typeface="Cambria Math" panose="02040503050406030204" pitchFamily="18" charset="0"/>
+                          </a:rPr>
+                        </m:ctrlPr>
+                      </m:funcPr>
+                      <m:fName>
+                        <m:sSub>
+                          <m:sSubPr>
+                            <m:ctrlPr>
+                              <a:rPr lang="en-US" i="1">
+                                <a:latin typeface="Cambria Math" panose="02040503050406030204" pitchFamily="18" charset="0"/>
+                              </a:rPr>
+                            </m:ctrlPr>
+                          </m:sSubPr>
+                          <m:e>
+                            <m:r>
+                              <m:rPr>
+                                <m:sty m:val="p"/>
+                              </m:rPr>
+                              <a:rPr lang="en-US">
+                                <a:latin typeface="Cambria Math" panose="02040503050406030204" pitchFamily="18" charset="0"/>
+                              </a:rPr>
+                              <m:t>log</m:t>
+                            </m:r>
+                          </m:e>
+                          <m:sub>
+                            <m:r>
+                              <a:rPr lang="en-US" i="1">
+                                <a:latin typeface="Cambria Math" panose="02040503050406030204" pitchFamily="18" charset="0"/>
+                              </a:rPr>
+                              <m:t>2</m:t>
+                            </m:r>
+                          </m:sub>
+                        </m:sSub>
+                      </m:fName>
+                      <m:e>
+                        <m:r>
+                          <a:rPr lang="en-US" i="1">
+                            <a:latin typeface="Cambria Math" panose="02040503050406030204" pitchFamily="18" charset="0"/>
+                          </a:rPr>
+                          <m:t>4</m:t>
+                        </m:r>
+                        <m:r>
+                          <a:rPr lang="en-US" i="1">
+                            <a:latin typeface="Cambria Math" panose="02040503050406030204" pitchFamily="18" charset="0"/>
+                          </a:rPr>
+                          <m:t>𝑁</m:t>
+                        </m:r>
+                      </m:e>
+                    </m:func>
+                    <m:r>
+                      <a:rPr lang="en-US" i="1">
+                        <a:latin typeface="Cambria Math" panose="02040503050406030204" pitchFamily="18" charset="0"/>
+                      </a:rPr>
+                      <m:t>−1]</m:t>
+                    </m:r>
+                  </m:oMath>
+                </a14:m>
+                <a:r>
+                  <a:rPr lang="en-US" dirty="0"/>
+                  <a:t> MACs)</a:t>
+                </a:r>
+              </a:p>
+            </p:txBody>
+          </p:sp>
+        </mc:Choice>
+        <mc:Fallback>
+          <p:sp>
+            <p:nvSpPr>
+              <p:cNvPr id="25" name="TextBox 24">
+                <a:extLst>
+                  <a:ext uri="{FF2B5EF4-FFF2-40B4-BE49-F238E27FC236}">
+                    <a16:creationId xmlns:a16="http://schemas.microsoft.com/office/drawing/2014/main" id="{50CC3851-CEBC-46A2-AB96-7D8DF5AA27E3}"/>
+                  </a:ext>
+                </a:extLst>
+              </p:cNvPr>
+              <p:cNvSpPr txBox="1">
+                <a:spLocks noRot="1" noChangeAspect="1" noMove="1" noResize="1" noEditPoints="1" noAdjustHandles="1" noChangeArrowheads="1" noChangeShapeType="1" noTextEdit="1"/>
+              </p:cNvSpPr>
+              <p:nvPr/>
+            </p:nvSpPr>
+            <p:spPr>
+              <a:xfrm>
+                <a:off x="6571211" y="963537"/>
+                <a:ext cx="2683823" cy="1200329"/>
+              </a:xfrm>
+              <a:prstGeom prst="rect">
+                <a:avLst/>
+              </a:prstGeom>
+              <a:blipFill>
+                <a:blip r:embed="rId3"/>
+                <a:stretch>
+                  <a:fillRect t="-2010" r="-1810" b="-6533"/>
+                </a:stretch>
+              </a:blipFill>
+              <a:ln>
+                <a:solidFill>
+                  <a:schemeClr val="tx1">
+                    <a:lumMod val="95000"/>
+                    <a:lumOff val="5000"/>
+                  </a:schemeClr>
+                </a:solidFill>
+              </a:ln>
+            </p:spPr>
+            <p:txBody>
+              <a:bodyPr/>
+              <a:lstStyle/>
+              <a:p>
+                <a:r>
+                  <a:rPr lang="en-US">
+                    <a:noFill/>
+                  </a:rPr>
+                  <a:t> </a:t>
+                </a:r>
+              </a:p>
+            </p:txBody>
+          </p:sp>
+        </mc:Fallback>
+      </mc:AlternateContent>
+      <p:cxnSp>
+        <p:nvCxnSpPr>
+          <p:cNvPr id="27" name="Connector: Elbow 26">
+            <a:extLst>
+              <a:ext uri="{FF2B5EF4-FFF2-40B4-BE49-F238E27FC236}">
+                <a16:creationId xmlns:a16="http://schemas.microsoft.com/office/drawing/2014/main" id="{AE7E70AE-DF25-4177-8D25-CDE78310CBEB}"/>
+              </a:ext>
+            </a:extLst>
+          </p:cNvPr>
+          <p:cNvCxnSpPr>
+            <a:cxnSpLocks/>
+            <a:stCxn id="10" idx="3"/>
+            <a:endCxn id="25" idx="1"/>
+          </p:cNvCxnSpPr>
+          <p:nvPr/>
+        </p:nvCxnSpPr>
+        <p:spPr>
+          <a:xfrm flipV="1">
+            <a:off x="5582194" y="1563702"/>
+            <a:ext cx="989017" cy="3693320"/>
+          </a:xfrm>
+          <a:prstGeom prst="bentConnector3">
+            <a:avLst/>
+          </a:prstGeom>
+          <a:ln>
+            <a:tailEnd type="triangle"/>
+          </a:ln>
+        </p:spPr>
+        <p:style>
+          <a:lnRef idx="1">
+            <a:schemeClr val="dk1"/>
+          </a:lnRef>
+          <a:fillRef idx="0">
+            <a:schemeClr val="dk1"/>
+          </a:fillRef>
+          <a:effectRef idx="0">
+            <a:schemeClr val="dk1"/>
+          </a:effectRef>
+          <a:fontRef idx="minor">
+            <a:schemeClr val="tx1"/>
+          </a:fontRef>
+        </p:style>
+      </p:cxnSp>
+      <p:sp>
+        <p:nvSpPr>
+          <p:cNvPr id="28" name="TextBox 27">
+            <a:extLst>
+              <a:ext uri="{FF2B5EF4-FFF2-40B4-BE49-F238E27FC236}">
+                <a16:creationId xmlns:a16="http://schemas.microsoft.com/office/drawing/2014/main" id="{A566CE58-4583-485C-907C-5D60FDF2D1BC}"/>
+              </a:ext>
+            </a:extLst>
+          </p:cNvPr>
+          <p:cNvSpPr txBox="1"/>
+          <p:nvPr/>
+        </p:nvSpPr>
+        <p:spPr>
+          <a:xfrm>
+            <a:off x="6571211" y="2671698"/>
+            <a:ext cx="2683823" cy="1477328"/>
+          </a:xfrm>
+          <a:prstGeom prst="rect">
+            <a:avLst/>
+          </a:prstGeom>
+          <a:noFill/>
+          <a:ln>
+            <a:solidFill>
+              <a:schemeClr val="tx1">
+                <a:lumMod val="95000"/>
+                <a:lumOff val="5000"/>
+              </a:schemeClr>
+            </a:solidFill>
+          </a:ln>
+        </p:spPr>
+        <p:txBody>
+          <a:bodyPr wrap="square" rtlCol="0">
+            <a:spAutoFit/>
+          </a:bodyPr>
+          <a:lstStyle/>
+          <a:p>
+            <a:pPr algn="ctr"/>
+            <a:r>
+              <a:rPr lang="en-US" dirty="0"/>
+              <a:t>Take the real and imaginary parts as the output blocks, but discard the first M samples</a:t>
+            </a:r>
+          </a:p>
+          <a:p>
+            <a:pPr algn="ctr"/>
+            <a:r>
+              <a:rPr lang="en-US" dirty="0"/>
+              <a:t>(No MAC operations)</a:t>
+            </a:r>
+          </a:p>
+        </p:txBody>
+      </p:sp>
+      <p:cxnSp>
+        <p:nvCxnSpPr>
+          <p:cNvPr id="29" name="Straight Arrow Connector 28">
+            <a:extLst>
+              <a:ext uri="{FF2B5EF4-FFF2-40B4-BE49-F238E27FC236}">
+                <a16:creationId xmlns:a16="http://schemas.microsoft.com/office/drawing/2014/main" id="{960E5A00-D214-4298-81FD-8425AB4441F0}"/>
+              </a:ext>
+            </a:extLst>
+          </p:cNvPr>
+          <p:cNvCxnSpPr>
+            <a:cxnSpLocks/>
+            <a:stCxn id="25" idx="2"/>
+            <a:endCxn id="28" idx="0"/>
+          </p:cNvCxnSpPr>
+          <p:nvPr/>
+        </p:nvCxnSpPr>
+        <p:spPr>
+          <a:xfrm>
+            <a:off x="7913123" y="2163866"/>
+            <a:ext cx="0" cy="507832"/>
+          </a:xfrm>
+          <a:prstGeom prst="straightConnector1">
+            <a:avLst/>
+          </a:prstGeom>
+          <a:ln>
+            <a:solidFill>
+              <a:schemeClr val="tx1"/>
+            </a:solidFill>
+            <a:tailEnd type="triangle"/>
+          </a:ln>
+        </p:spPr>
+        <p:style>
+          <a:lnRef idx="1">
+            <a:schemeClr val="accent1"/>
+          </a:lnRef>
+          <a:fillRef idx="0">
+            <a:schemeClr val="accent1"/>
+          </a:fillRef>
+          <a:effectRef idx="0">
+            <a:schemeClr val="accent1"/>
+          </a:effectRef>
+          <a:fontRef idx="minor">
+            <a:schemeClr val="tx1"/>
+          </a:fontRef>
+        </p:style>
+      </p:cxnSp>
+      <p:sp>
+        <p:nvSpPr>
+          <p:cNvPr id="31" name="TextBox 30">
+            <a:extLst>
+              <a:ext uri="{FF2B5EF4-FFF2-40B4-BE49-F238E27FC236}">
+                <a16:creationId xmlns:a16="http://schemas.microsoft.com/office/drawing/2014/main" id="{29C07CD2-540F-4998-AAC2-B321071E64C0}"/>
+              </a:ext>
+            </a:extLst>
+          </p:cNvPr>
+          <p:cNvSpPr txBox="1"/>
+          <p:nvPr/>
+        </p:nvSpPr>
+        <p:spPr>
+          <a:xfrm>
+            <a:off x="6571209" y="4594813"/>
+            <a:ext cx="2683823" cy="1477328"/>
+          </a:xfrm>
+          <a:prstGeom prst="rect">
+            <a:avLst/>
+          </a:prstGeom>
+          <a:noFill/>
+          <a:ln>
+            <a:solidFill>
+              <a:srgbClr val="00B050"/>
+            </a:solidFill>
+          </a:ln>
+        </p:spPr>
+        <p:txBody>
+          <a:bodyPr wrap="square" rtlCol="0">
+            <a:spAutoFit/>
+          </a:bodyPr>
+          <a:lstStyle/>
+          <a:p>
+            <a:pPr algn="ctr"/>
+            <a:r>
+              <a:rPr lang="en-US" dirty="0"/>
+              <a:t>N-M samples of output are generated per output stream, so 2(N-M) output samples are generated total</a:t>
+            </a:r>
+          </a:p>
+        </p:txBody>
+      </p:sp>
+      <p:cxnSp>
+        <p:nvCxnSpPr>
+          <p:cNvPr id="32" name="Straight Arrow Connector 31">
+            <a:extLst>
+              <a:ext uri="{FF2B5EF4-FFF2-40B4-BE49-F238E27FC236}">
+                <a16:creationId xmlns:a16="http://schemas.microsoft.com/office/drawing/2014/main" id="{252979BE-19F7-411C-9DEC-9324E3DA44D3}"/>
+              </a:ext>
+            </a:extLst>
+          </p:cNvPr>
+          <p:cNvCxnSpPr>
+            <a:cxnSpLocks/>
+            <a:stCxn id="28" idx="2"/>
+            <a:endCxn id="31" idx="0"/>
+          </p:cNvCxnSpPr>
+          <p:nvPr/>
+        </p:nvCxnSpPr>
+        <p:spPr>
+          <a:xfrm flipH="1">
+            <a:off x="7913121" y="4149026"/>
+            <a:ext cx="2" cy="445787"/>
+          </a:xfrm>
+          <a:prstGeom prst="straightConnector1">
+            <a:avLst/>
+          </a:prstGeom>
+          <a:ln>
+            <a:solidFill>
+              <a:schemeClr val="tx1"/>
+            </a:solidFill>
+            <a:tailEnd type="triangle"/>
+          </a:ln>
+        </p:spPr>
+        <p:style>
+          <a:lnRef idx="1">
+            <a:schemeClr val="accent1"/>
+          </a:lnRef>
+          <a:fillRef idx="0">
+            <a:schemeClr val="accent1"/>
+          </a:fillRef>
+          <a:effectRef idx="0">
+            <a:schemeClr val="accent1"/>
+          </a:effectRef>
+          <a:fontRef idx="minor">
+            <a:schemeClr val="tx1"/>
+          </a:fontRef>
+        </p:style>
+      </p:cxnSp>
+      <p:sp>
+        <p:nvSpPr>
+          <p:cNvPr id="41" name="TextBox 40">
+            <a:extLst>
+              <a:ext uri="{FF2B5EF4-FFF2-40B4-BE49-F238E27FC236}">
+                <a16:creationId xmlns:a16="http://schemas.microsoft.com/office/drawing/2014/main" id="{60FA1BA0-9362-43FD-9AFF-EAE9FF1FA4AB}"/>
+              </a:ext>
+            </a:extLst>
+          </p:cNvPr>
+          <p:cNvSpPr txBox="1"/>
+          <p:nvPr/>
+        </p:nvSpPr>
+        <p:spPr>
+          <a:xfrm>
+            <a:off x="0" y="0"/>
+            <a:ext cx="12192000" cy="369332"/>
+          </a:xfrm>
+          <a:prstGeom prst="rect">
+            <a:avLst/>
+          </a:prstGeom>
+          <a:noFill/>
+        </p:spPr>
+        <p:txBody>
+          <a:bodyPr wrap="square" rtlCol="0">
+            <a:spAutoFit/>
+          </a:bodyPr>
+          <a:lstStyle/>
+          <a:p>
+            <a:pPr algn="ctr"/>
+            <a:r>
+              <a:rPr lang="en-US" dirty="0"/>
+              <a:t>OVERLAP-SAVE</a:t>
+            </a:r>
+          </a:p>
+        </p:txBody>
+      </p:sp>
+    </p:spTree>
+    <p:extLst>
+      <p:ext uri="{BB962C8B-B14F-4D97-AF65-F5344CB8AC3E}">
+        <p14:creationId xmlns:p14="http://schemas.microsoft.com/office/powerpoint/2010/main" val="4286665816"/>
+      </p:ext>
+    </p:extLst>
+  </p:cSld>
+  <p:clrMapOvr>
+    <a:masterClrMapping/>
+  </p:clrMapOvr>
+</p:sld>
+</file>
+
+<file path=ppt/slides/slide2.xml><?xml version="1.0" encoding="utf-8"?>
+<p:sld xmlns:a="http://schemas.openxmlformats.org/drawingml/2006/main" xmlns:r="http://schemas.openxmlformats.org/officeDocument/2006/relationships" xmlns:p="http://schemas.openxmlformats.org/presentationml/2006/main">
+  <p:cSld>
+    <p:spTree>
+      <p:nvGrpSpPr>
+        <p:cNvPr id="1" name=""/>
+        <p:cNvGrpSpPr/>
+        <p:nvPr/>
+      </p:nvGrpSpPr>
+      <p:grpSpPr>
+        <a:xfrm>
+          <a:off x="0" y="0"/>
+          <a:ext cx="0" cy="0"/>
+          <a:chOff x="0" y="0"/>
+          <a:chExt cx="0" cy="0"/>
+        </a:xfrm>
+      </p:grpSpPr>
+      <p:sp>
+        <p:nvSpPr>
+          <p:cNvPr id="4" name="TextBox 3">
+            <a:extLst>
+              <a:ext uri="{FF2B5EF4-FFF2-40B4-BE49-F238E27FC236}">
+                <a16:creationId xmlns:a16="http://schemas.microsoft.com/office/drawing/2014/main" id="{0FEB0225-0A51-452F-A053-D282D094AB50}"/>
+              </a:ext>
+            </a:extLst>
+          </p:cNvPr>
+          <p:cNvSpPr txBox="1"/>
+          <p:nvPr/>
+        </p:nvSpPr>
+        <p:spPr>
+          <a:xfrm>
+            <a:off x="1069571" y="779318"/>
+            <a:ext cx="2683823" cy="1477328"/>
+          </a:xfrm>
+          <a:prstGeom prst="rect">
+            <a:avLst/>
+          </a:prstGeom>
+          <a:noFill/>
+          <a:ln>
+            <a:solidFill>
+              <a:schemeClr val="tx1">
+                <a:lumMod val="95000"/>
+                <a:lumOff val="5000"/>
+              </a:schemeClr>
+            </a:solidFill>
+          </a:ln>
+        </p:spPr>
+        <p:txBody>
+          <a:bodyPr wrap="square" rtlCol="0">
+            <a:spAutoFit/>
+          </a:bodyPr>
+          <a:lstStyle/>
+          <a:p>
+            <a:pPr algn="ctr"/>
+            <a:r>
+              <a:rPr lang="en-US" dirty="0"/>
+              <a:t>Get two signal blocks of length (N-M) from both signal streams and zero-pad them to length N</a:t>
+            </a:r>
+          </a:p>
+          <a:p>
+            <a:pPr algn="ctr"/>
+            <a:r>
+              <a:rPr lang="en-US" dirty="0"/>
+              <a:t>(No MAC operations)</a:t>
+            </a:r>
+          </a:p>
+        </p:txBody>
+      </p:sp>
+      <p:cxnSp>
+        <p:nvCxnSpPr>
+          <p:cNvPr id="6" name="Straight Arrow Connector 5">
+            <a:extLst>
+              <a:ext uri="{FF2B5EF4-FFF2-40B4-BE49-F238E27FC236}">
+                <a16:creationId xmlns:a16="http://schemas.microsoft.com/office/drawing/2014/main" id="{1C2C279B-D8CE-4E4C-BB75-906D79AF5301}"/>
+              </a:ext>
+            </a:extLst>
+          </p:cNvPr>
+          <p:cNvCxnSpPr>
+            <a:cxnSpLocks/>
+            <a:stCxn id="4" idx="2"/>
+          </p:cNvCxnSpPr>
+          <p:nvPr/>
+        </p:nvCxnSpPr>
+        <p:spPr>
+          <a:xfrm>
+            <a:off x="2411483" y="2256646"/>
+            <a:ext cx="0" cy="369332"/>
+          </a:xfrm>
+          <a:prstGeom prst="straightConnector1">
+            <a:avLst/>
+          </a:prstGeom>
+          <a:ln>
+            <a:solidFill>
+              <a:schemeClr val="tx1"/>
+            </a:solidFill>
+            <a:tailEnd type="triangle"/>
+          </a:ln>
+        </p:spPr>
+        <p:style>
+          <a:lnRef idx="1">
+            <a:schemeClr val="accent1"/>
+          </a:lnRef>
+          <a:fillRef idx="0">
+            <a:schemeClr val="accent1"/>
+          </a:fillRef>
+          <a:effectRef idx="0">
+            <a:schemeClr val="accent1"/>
+          </a:effectRef>
+          <a:fontRef idx="minor">
+            <a:schemeClr val="tx1"/>
+          </a:fontRef>
+        </p:style>
+      </p:cxnSp>
+      <mc:AlternateContent xmlns:mc="http://schemas.openxmlformats.org/markup-compatibility/2006" xmlns:a14="http://schemas.microsoft.com/office/drawing/2010/main">
+        <mc:Choice Requires="a14">
+          <p:sp>
+            <p:nvSpPr>
+              <p:cNvPr id="8" name="TextBox 7">
+                <a:extLst>
+                  <a:ext uri="{FF2B5EF4-FFF2-40B4-BE49-F238E27FC236}">
+                    <a16:creationId xmlns:a16="http://schemas.microsoft.com/office/drawing/2014/main" id="{BCF5A1F4-4CF4-423D-B025-5C33EF7DB52C}"/>
+                  </a:ext>
+                </a:extLst>
+              </p:cNvPr>
+              <p:cNvSpPr txBox="1"/>
+              <p:nvPr/>
+            </p:nvSpPr>
+            <p:spPr>
+              <a:xfrm>
+                <a:off x="1069571" y="2625978"/>
+                <a:ext cx="2683823" cy="1200329"/>
+              </a:xfrm>
+              <a:prstGeom prst="rect">
+                <a:avLst/>
+              </a:prstGeom>
+              <a:noFill/>
+              <a:ln>
+                <a:solidFill>
+                  <a:schemeClr val="tx1">
+                    <a:lumMod val="95000"/>
+                    <a:lumOff val="5000"/>
+                  </a:schemeClr>
+                </a:solidFill>
+              </a:ln>
+            </p:spPr>
+            <p:txBody>
+              <a:bodyPr wrap="square" rtlCol="0">
+                <a:spAutoFit/>
+              </a:bodyPr>
+              <a:lstStyle/>
+              <a:p>
+                <a:pPr algn="ctr"/>
+                <a:r>
+                  <a:rPr lang="en-US" dirty="0"/>
+                  <a:t>Process the FFT of the combined signal blocks as complex input (</a:t>
+                </a:r>
+                <a14:m>
+                  <m:oMath xmlns:m="http://schemas.openxmlformats.org/officeDocument/2006/math">
+                    <m:r>
+                      <a:rPr lang="en-US" b="0" i="1" smtClean="0">
+                        <a:latin typeface="Cambria Math" panose="02040503050406030204" pitchFamily="18" charset="0"/>
+                      </a:rPr>
+                      <m:t>2</m:t>
+                    </m:r>
+                    <m:r>
+                      <a:rPr lang="en-US" b="0" i="1" smtClean="0">
+                        <a:latin typeface="Cambria Math" panose="02040503050406030204" pitchFamily="18" charset="0"/>
+                      </a:rPr>
+                      <m:t>𝑁</m:t>
+                    </m:r>
+                    <m:r>
+                      <a:rPr lang="en-US" b="0" i="1" smtClean="0">
+                        <a:latin typeface="Cambria Math" panose="02040503050406030204" pitchFamily="18" charset="0"/>
+                      </a:rPr>
+                      <m:t>[</m:t>
+                    </m:r>
+                    <m:func>
+                      <m:funcPr>
+                        <m:ctrlPr>
+                          <a:rPr lang="en-US" b="0" i="1" smtClean="0">
+                            <a:latin typeface="Cambria Math" panose="02040503050406030204" pitchFamily="18" charset="0"/>
+                          </a:rPr>
+                        </m:ctrlPr>
+                      </m:funcPr>
+                      <m:fName>
+                        <m:sSub>
+                          <m:sSubPr>
+                            <m:ctrlPr>
+                              <a:rPr lang="en-US" b="0" i="1" smtClean="0">
+                                <a:latin typeface="Cambria Math" panose="02040503050406030204" pitchFamily="18" charset="0"/>
+                              </a:rPr>
+                            </m:ctrlPr>
+                          </m:sSubPr>
+                          <m:e>
+                            <m:r>
+                              <m:rPr>
+                                <m:sty m:val="p"/>
+                              </m:rPr>
+                              <a:rPr lang="en-US" b="0" i="0" smtClean="0">
+                                <a:latin typeface="Cambria Math" panose="02040503050406030204" pitchFamily="18" charset="0"/>
+                              </a:rPr>
+                              <m:t>log</m:t>
+                            </m:r>
+                          </m:e>
+                          <m:sub>
+                            <m:r>
+                              <a:rPr lang="en-US" b="0" i="1" smtClean="0">
+                                <a:latin typeface="Cambria Math" panose="02040503050406030204" pitchFamily="18" charset="0"/>
+                              </a:rPr>
+                              <m:t>2</m:t>
+                            </m:r>
+                          </m:sub>
+                        </m:sSub>
+                      </m:fName>
+                      <m:e>
+                        <m:r>
+                          <a:rPr lang="en-US" b="0" i="1" smtClean="0">
+                            <a:latin typeface="Cambria Math" panose="02040503050406030204" pitchFamily="18" charset="0"/>
+                          </a:rPr>
+                          <m:t>4</m:t>
+                        </m:r>
+                        <m:r>
+                          <a:rPr lang="en-US" b="0" i="1" smtClean="0">
+                            <a:latin typeface="Cambria Math" panose="02040503050406030204" pitchFamily="18" charset="0"/>
+                          </a:rPr>
+                          <m:t>𝑁</m:t>
+                        </m:r>
+                      </m:e>
+                    </m:func>
+                    <m:r>
+                      <a:rPr lang="en-US" b="0" i="1" smtClean="0">
+                        <a:latin typeface="Cambria Math" panose="02040503050406030204" pitchFamily="18" charset="0"/>
+                      </a:rPr>
+                      <m:t>−1]</m:t>
+                    </m:r>
+                  </m:oMath>
+                </a14:m>
+                <a:r>
+                  <a:rPr lang="en-US" dirty="0"/>
+                  <a:t> MACs)</a:t>
+                </a:r>
+              </a:p>
+            </p:txBody>
+          </p:sp>
+        </mc:Choice>
+        <mc:Fallback xmlns="">
+          <p:sp>
+            <p:nvSpPr>
+              <p:cNvPr id="8" name="TextBox 7">
+                <a:extLst>
+                  <a:ext uri="{FF2B5EF4-FFF2-40B4-BE49-F238E27FC236}">
+                    <a16:creationId xmlns:a16="http://schemas.microsoft.com/office/drawing/2014/main" id="{BCF5A1F4-4CF4-423D-B025-5C33EF7DB52C}"/>
+                  </a:ext>
+                </a:extLst>
+              </p:cNvPr>
+              <p:cNvSpPr txBox="1">
+                <a:spLocks noRot="1" noChangeAspect="1" noMove="1" noResize="1" noEditPoints="1" noAdjustHandles="1" noChangeArrowheads="1" noChangeShapeType="1" noTextEdit="1"/>
+              </p:cNvSpPr>
+              <p:nvPr/>
+            </p:nvSpPr>
+            <p:spPr>
+              <a:xfrm>
                 <a:off x="1069571" y="2625978"/>
                 <a:ext cx="2683823" cy="1200329"/>
               </a:xfrm>
@@ -3785,8 +4653,8 @@
           </a:fontRef>
         </p:style>
       </p:cxnSp>
-      <mc:AlternateContent xmlns:mc="http://schemas.openxmlformats.org/markup-compatibility/2006">
-        <mc:Choice xmlns:a14="http://schemas.microsoft.com/office/drawing/2010/main" Requires="a14">
+      <mc:AlternateContent xmlns:mc="http://schemas.openxmlformats.org/markup-compatibility/2006" xmlns:a14="http://schemas.microsoft.com/office/drawing/2010/main">
+        <mc:Choice Requires="a14">
           <p:sp>
             <p:nvSpPr>
               <p:cNvPr id="28" name="TextBox 27">
@@ -3924,7 +4792,7 @@
             </p:txBody>
           </p:sp>
         </mc:Choice>
-        <mc:Fallback>
+        <mc:Fallback xmlns="">
           <p:sp>
             <p:nvSpPr>
               <p:cNvPr id="28" name="TextBox 27">
@@ -4061,17 +4929,16 @@
           <a:p>
             <a:pPr algn="ctr"/>
             <a:r>
-              <a:rPr lang="en-US"/>
-              <a:t>Take the real and imaginary parts as the output blocks, but discard the first M samples</a:t>
+              <a:rPr lang="en-US" dirty="0"/>
+              <a:t>Take the real and imaginary parts as the output blocks, add them to the output vector</a:t>
             </a:r>
           </a:p>
           <a:p>
             <a:pPr algn="ctr"/>
             <a:r>
-              <a:rPr lang="en-US"/>
+              <a:rPr lang="en-US" dirty="0"/>
               <a:t>(No MAC operations)</a:t>
             </a:r>
-            <a:endParaRPr lang="en-US" dirty="0"/>
           </a:p>
         </p:txBody>
       </p:sp>
@@ -4234,7 +5101,7 @@
             <a:pPr algn="ctr"/>
             <a:r>
               <a:rPr lang="en-US" dirty="0"/>
-              <a:t>OVERLAP-SAVE</a:t>
+              <a:t>OVERLAP-ADD</a:t>
             </a:r>
           </a:p>
         </p:txBody>
@@ -4242,7 +5109,7 @@
     </p:spTree>
     <p:extLst>
       <p:ext uri="{BB962C8B-B14F-4D97-AF65-F5344CB8AC3E}">
-        <p14:creationId xmlns:p14="http://schemas.microsoft.com/office/powerpoint/2010/main" val="4286665816"/>
+        <p14:creationId xmlns:p14="http://schemas.microsoft.com/office/powerpoint/2010/main" val="760144086"/>
       </p:ext>
     </p:extLst>
   </p:cSld>
@@ -4252,7 +5119,7 @@
 </p:sld>
 </file>
 
-<file path=ppt/slides/slide2.xml><?xml version="1.0" encoding="utf-8"?>
+<file path=ppt/slides/slide3.xml><?xml version="1.0" encoding="utf-8"?>
 <p:sld xmlns:a="http://schemas.openxmlformats.org/drawingml/2006/main" xmlns:r="http://schemas.openxmlformats.org/officeDocument/2006/relationships" xmlns:p="http://schemas.openxmlformats.org/presentationml/2006/main">
   <p:cSld>
     <p:spTree>
@@ -4274,7 +5141,7 @@
           <p:cNvPr id="4" name="TextBox 3">
             <a:extLst>
               <a:ext uri="{FF2B5EF4-FFF2-40B4-BE49-F238E27FC236}">
-                <a16:creationId xmlns:a16="http://schemas.microsoft.com/office/drawing/2014/main" id="{0FEB0225-0A51-452F-A053-D282D094AB50}"/>
+                <a16:creationId xmlns:a16="http://schemas.microsoft.com/office/drawing/2014/main" id="{A4388AC5-E96D-4AD8-9FE6-EA9BEAD8A27E}"/>
               </a:ext>
             </a:extLst>
           </p:cNvPr>
@@ -4283,7 +5150,7 @@
         </p:nvSpPr>
         <p:spPr>
           <a:xfrm>
-            <a:off x="1069571" y="779318"/>
+            <a:off x="2913611" y="779318"/>
             <a:ext cx="2683823" cy="1477328"/>
           </a:xfrm>
           <a:prstGeom prst="rect">
@@ -4322,10 +5189,10 @@
       </p:sp>
       <p:cxnSp>
         <p:nvCxnSpPr>
-          <p:cNvPr id="6" name="Straight Arrow Connector 5">
-            <a:extLst>
-              <a:ext uri="{FF2B5EF4-FFF2-40B4-BE49-F238E27FC236}">
-                <a16:creationId xmlns:a16="http://schemas.microsoft.com/office/drawing/2014/main" id="{1C2C279B-D8CE-4E4C-BB75-906D79AF5301}"/>
+          <p:cNvPr id="5" name="Straight Arrow Connector 4">
+            <a:extLst>
+              <a:ext uri="{FF2B5EF4-FFF2-40B4-BE49-F238E27FC236}">
+                <a16:creationId xmlns:a16="http://schemas.microsoft.com/office/drawing/2014/main" id="{08171773-96D4-47DA-AC3B-DD0C9DCE8A84}"/>
               </a:ext>
             </a:extLst>
           </p:cNvPr>
@@ -4337,7 +5204,7 @@
         </p:nvCxnSpPr>
         <p:spPr>
           <a:xfrm>
-            <a:off x="2411483" y="2256646"/>
+            <a:off x="4255523" y="2256646"/>
             <a:ext cx="0" cy="369332"/>
           </a:xfrm>
           <a:prstGeom prst="straightConnector1">
@@ -4369,10 +5236,10 @@
         <mc:Choice xmlns:a14="http://schemas.microsoft.com/office/drawing/2010/main" Requires="a14">
           <p:sp>
             <p:nvSpPr>
-              <p:cNvPr id="8" name="TextBox 7">
+              <p:cNvPr id="6" name="TextBox 5">
                 <a:extLst>
                   <a:ext uri="{FF2B5EF4-FFF2-40B4-BE49-F238E27FC236}">
-                    <a16:creationId xmlns:a16="http://schemas.microsoft.com/office/drawing/2014/main" id="{BCF5A1F4-4CF4-423D-B025-5C33EF7DB52C}"/>
+                    <a16:creationId xmlns:a16="http://schemas.microsoft.com/office/drawing/2014/main" id="{395A6830-176B-491B-81E6-A12FAB69DB19}"/>
                   </a:ext>
                 </a:extLst>
               </p:cNvPr>
@@ -4381,7 +5248,7 @@
             </p:nvSpPr>
             <p:spPr>
               <a:xfrm>
-                <a:off x="1069571" y="2625978"/>
+                <a:off x="2913611" y="2625978"/>
                 <a:ext cx="2683823" cy="1200329"/>
               </a:xfrm>
               <a:prstGeom prst="rect">
@@ -4500,10 +5367,10 @@
         <mc:Fallback>
           <p:sp>
             <p:nvSpPr>
-              <p:cNvPr id="8" name="TextBox 7">
+              <p:cNvPr id="6" name="TextBox 5">
                 <a:extLst>
                   <a:ext uri="{FF2B5EF4-FFF2-40B4-BE49-F238E27FC236}">
-                    <a16:creationId xmlns:a16="http://schemas.microsoft.com/office/drawing/2014/main" id="{BCF5A1F4-4CF4-423D-B025-5C33EF7DB52C}"/>
+                    <a16:creationId xmlns:a16="http://schemas.microsoft.com/office/drawing/2014/main" id="{395A6830-176B-491B-81E6-A12FAB69DB19}"/>
                   </a:ext>
                 </a:extLst>
               </p:cNvPr>
@@ -4514,7 +5381,7 @@
             </p:nvSpPr>
             <p:spPr>
               <a:xfrm>
-                <a:off x="1069571" y="2625978"/>
+                <a:off x="2913611" y="2625978"/>
                 <a:ext cx="2683823" cy="1200329"/>
               </a:xfrm>
               <a:prstGeom prst="rect">
@@ -4523,7 +5390,7 @@
               <a:blipFill>
                 <a:blip r:embed="rId2"/>
                 <a:stretch>
-                  <a:fillRect t="-2513" r="-1354" b="-6533"/>
+                  <a:fillRect t="-2513" r="-1584" b="-6533"/>
                 </a:stretch>
               </a:blipFill>
               <a:ln>
@@ -4552,22 +5419,22 @@
       </mc:AlternateContent>
       <p:cxnSp>
         <p:nvCxnSpPr>
-          <p:cNvPr id="9" name="Straight Arrow Connector 8">
-            <a:extLst>
-              <a:ext uri="{FF2B5EF4-FFF2-40B4-BE49-F238E27FC236}">
-                <a16:creationId xmlns:a16="http://schemas.microsoft.com/office/drawing/2014/main" id="{8D502F91-F651-4B9D-83F0-83F548D0CA40}"/>
+          <p:cNvPr id="7" name="Straight Arrow Connector 6">
+            <a:extLst>
+              <a:ext uri="{FF2B5EF4-FFF2-40B4-BE49-F238E27FC236}">
+                <a16:creationId xmlns:a16="http://schemas.microsoft.com/office/drawing/2014/main" id="{4334AA58-4988-4B48-AA94-30FAC0216795}"/>
               </a:ext>
             </a:extLst>
           </p:cNvPr>
           <p:cNvCxnSpPr>
             <a:cxnSpLocks/>
-            <a:stCxn id="8" idx="2"/>
+            <a:stCxn id="6" idx="2"/>
           </p:cNvCxnSpPr>
           <p:nvPr/>
         </p:nvCxnSpPr>
         <p:spPr>
           <a:xfrm>
-            <a:off x="2411483" y="3826307"/>
+            <a:off x="4255523" y="3826307"/>
             <a:ext cx="0" cy="646331"/>
           </a:xfrm>
           <a:prstGeom prst="straightConnector1">
@@ -4597,10 +5464,10 @@
       </p:cxnSp>
       <p:sp>
         <p:nvSpPr>
-          <p:cNvPr id="10" name="TextBox 9">
-            <a:extLst>
-              <a:ext uri="{FF2B5EF4-FFF2-40B4-BE49-F238E27FC236}">
-                <a16:creationId xmlns:a16="http://schemas.microsoft.com/office/drawing/2014/main" id="{1A6E9B4C-749E-4F03-8F85-EC5A7A54EAED}"/>
+          <p:cNvPr id="8" name="TextBox 7">
+            <a:extLst>
+              <a:ext uri="{FF2B5EF4-FFF2-40B4-BE49-F238E27FC236}">
+                <a16:creationId xmlns:a16="http://schemas.microsoft.com/office/drawing/2014/main" id="{FAC211E9-A06A-4C64-AEA6-FE621C1C4750}"/>
               </a:ext>
             </a:extLst>
           </p:cNvPr>
@@ -4609,8 +5476,8 @@
         </p:nvSpPr>
         <p:spPr>
           <a:xfrm>
-            <a:off x="1069571" y="4472638"/>
-            <a:ext cx="2683823" cy="923330"/>
+            <a:off x="2913611" y="4472638"/>
+            <a:ext cx="2683823" cy="1477328"/>
           </a:xfrm>
           <a:prstGeom prst="rect">
             <a:avLst/>
@@ -4634,58 +5501,7 @@
             <a:pPr algn="ctr"/>
             <a:r>
               <a:rPr lang="en-US" dirty="0"/>
-              <a:t>Extract the FFT of the individual signals </a:t>
-            </a:r>
-          </a:p>
-          <a:p>
-            <a:pPr algn="ctr"/>
-            <a:r>
-              <a:rPr lang="en-US" dirty="0"/>
-              <a:t>(4N MACs)</a:t>
-            </a:r>
-          </a:p>
-        </p:txBody>
-      </p:sp>
-      <p:sp>
-        <p:nvSpPr>
-          <p:cNvPr id="25" name="TextBox 24">
-            <a:extLst>
-              <a:ext uri="{FF2B5EF4-FFF2-40B4-BE49-F238E27FC236}">
-                <a16:creationId xmlns:a16="http://schemas.microsoft.com/office/drawing/2014/main" id="{50CC3851-CEBC-46A2-AB96-7D8DF5AA27E3}"/>
-              </a:ext>
-            </a:extLst>
-          </p:cNvPr>
-          <p:cNvSpPr txBox="1"/>
-          <p:nvPr/>
-        </p:nvSpPr>
-        <p:spPr>
-          <a:xfrm>
-            <a:off x="4742411" y="917817"/>
-            <a:ext cx="2683823" cy="1200329"/>
-          </a:xfrm>
-          <a:prstGeom prst="rect">
-            <a:avLst/>
-          </a:prstGeom>
-          <a:noFill/>
-          <a:ln>
-            <a:solidFill>
-              <a:schemeClr val="tx1">
-                <a:lumMod val="95000"/>
-                <a:lumOff val="5000"/>
-              </a:schemeClr>
-            </a:solidFill>
-          </a:ln>
-        </p:spPr>
-        <p:txBody>
-          <a:bodyPr wrap="square" rtlCol="0">
-            <a:spAutoFit/>
-          </a:bodyPr>
-          <a:lstStyle/>
-          <a:p>
-            <a:pPr algn="ctr"/>
-            <a:r>
-              <a:rPr lang="en-US" dirty="0"/>
-              <a:t>Multiply the UPR and signal responses to get the transform of both outputs</a:t>
+              <a:t>Multiply the UPR and signal transforms to get the transform of both outputs</a:t>
             </a:r>
           </a:p>
           <a:p>
@@ -4697,56 +5513,14 @@
           </a:p>
         </p:txBody>
       </p:sp>
-      <p:cxnSp>
-        <p:nvCxnSpPr>
-          <p:cNvPr id="27" name="Connector: Elbow 26">
-            <a:extLst>
-              <a:ext uri="{FF2B5EF4-FFF2-40B4-BE49-F238E27FC236}">
-                <a16:creationId xmlns:a16="http://schemas.microsoft.com/office/drawing/2014/main" id="{AE7E70AE-DF25-4177-8D25-CDE78310CBEB}"/>
-              </a:ext>
-            </a:extLst>
-          </p:cNvPr>
-          <p:cNvCxnSpPr>
-            <a:stCxn id="10" idx="3"/>
-            <a:endCxn id="25" idx="1"/>
-          </p:cNvCxnSpPr>
-          <p:nvPr/>
-        </p:nvCxnSpPr>
-        <p:spPr>
-          <a:xfrm flipV="1">
-            <a:off x="3753394" y="1517982"/>
-            <a:ext cx="989017" cy="3416321"/>
-          </a:xfrm>
-          <a:prstGeom prst="bentConnector3">
-            <a:avLst/>
-          </a:prstGeom>
-          <a:ln>
-            <a:tailEnd type="triangle"/>
-          </a:ln>
-        </p:spPr>
-        <p:style>
-          <a:lnRef idx="1">
-            <a:schemeClr val="dk1"/>
-          </a:lnRef>
-          <a:fillRef idx="0">
-            <a:schemeClr val="dk1"/>
-          </a:fillRef>
-          <a:effectRef idx="0">
-            <a:schemeClr val="dk1"/>
-          </a:effectRef>
-          <a:fontRef idx="minor">
-            <a:schemeClr val="tx1"/>
-          </a:fontRef>
-        </p:style>
-      </p:cxnSp>
       <mc:AlternateContent xmlns:mc="http://schemas.openxmlformats.org/markup-compatibility/2006">
         <mc:Choice xmlns:a14="http://schemas.microsoft.com/office/drawing/2010/main" Requires="a14">
           <p:sp>
             <p:nvSpPr>
-              <p:cNvPr id="28" name="TextBox 27">
+              <p:cNvPr id="9" name="TextBox 8">
                 <a:extLst>
                   <a:ext uri="{FF2B5EF4-FFF2-40B4-BE49-F238E27FC236}">
-                    <a16:creationId xmlns:a16="http://schemas.microsoft.com/office/drawing/2014/main" id="{A566CE58-4583-485C-907C-5D60FDF2D1BC}"/>
+                    <a16:creationId xmlns:a16="http://schemas.microsoft.com/office/drawing/2014/main" id="{21932055-ECDE-4569-A765-5A7C563D9FD1}"/>
                   </a:ext>
                 </a:extLst>
               </p:cNvPr>
@@ -4755,7 +5529,7 @@
             </p:nvSpPr>
             <p:spPr>
               <a:xfrm>
-                <a:off x="4742411" y="2625978"/>
+                <a:off x="6586451" y="917817"/>
                 <a:ext cx="2683823" cy="1200329"/>
               </a:xfrm>
               <a:prstGeom prst="rect">
@@ -4792,19 +5566,19 @@
                 <a14:m>
                   <m:oMath xmlns:m="http://schemas.openxmlformats.org/officeDocument/2006/math">
                     <m:r>
-                      <a:rPr lang="en-US" b="0" i="1" smtClean="0">
+                      <a:rPr lang="en-US" i="1">
                         <a:latin typeface="Cambria Math" panose="02040503050406030204" pitchFamily="18" charset="0"/>
                       </a:rPr>
                       <m:t>2</m:t>
                     </m:r>
                     <m:r>
-                      <a:rPr lang="en-US" b="0" i="1" smtClean="0">
+                      <a:rPr lang="en-US" i="1">
                         <a:latin typeface="Cambria Math" panose="02040503050406030204" pitchFamily="18" charset="0"/>
                       </a:rPr>
                       <m:t>𝑁</m:t>
                     </m:r>
                     <m:r>
-                      <a:rPr lang="en-US" b="0" i="1" smtClean="0">
+                      <a:rPr lang="en-US" i="1">
                         <a:latin typeface="Cambria Math" panose="02040503050406030204" pitchFamily="18" charset="0"/>
                       </a:rPr>
                       <m:t>[</m:t>
@@ -4812,7 +5586,7 @@
                     <m:func>
                       <m:funcPr>
                         <m:ctrlPr>
-                          <a:rPr lang="en-US" b="0" i="1" smtClean="0">
+                          <a:rPr lang="en-US" i="1">
                             <a:latin typeface="Cambria Math" panose="02040503050406030204" pitchFamily="18" charset="0"/>
                           </a:rPr>
                         </m:ctrlPr>
@@ -4821,7 +5595,7 @@
                         <m:sSub>
                           <m:sSubPr>
                             <m:ctrlPr>
-                              <a:rPr lang="en-US" b="0" i="1" smtClean="0">
+                              <a:rPr lang="en-US" i="1">
                                 <a:latin typeface="Cambria Math" panose="02040503050406030204" pitchFamily="18" charset="0"/>
                               </a:rPr>
                             </m:ctrlPr>
@@ -4831,7 +5605,7 @@
                               <m:rPr>
                                 <m:sty m:val="p"/>
                               </m:rPr>
-                              <a:rPr lang="en-US" b="0" i="0" smtClean="0">
+                              <a:rPr lang="en-US">
                                 <a:latin typeface="Cambria Math" panose="02040503050406030204" pitchFamily="18" charset="0"/>
                               </a:rPr>
                               <m:t>log</m:t>
@@ -4839,7 +5613,7 @@
                           </m:e>
                           <m:sub>
                             <m:r>
-                              <a:rPr lang="en-US" b="0" i="1" smtClean="0">
+                              <a:rPr lang="en-US" i="1">
                                 <a:latin typeface="Cambria Math" panose="02040503050406030204" pitchFamily="18" charset="0"/>
                               </a:rPr>
                               <m:t>2</m:t>
@@ -4849,13 +5623,13 @@
                       </m:fName>
                       <m:e>
                         <m:r>
-                          <a:rPr lang="en-US" b="0" i="1" smtClean="0">
+                          <a:rPr lang="en-US" i="1">
                             <a:latin typeface="Cambria Math" panose="02040503050406030204" pitchFamily="18" charset="0"/>
                           </a:rPr>
                           <m:t>4</m:t>
                         </m:r>
                         <m:r>
-                          <a:rPr lang="en-US" b="0" i="1" smtClean="0">
+                          <a:rPr lang="en-US" i="1">
                             <a:latin typeface="Cambria Math" panose="02040503050406030204" pitchFamily="18" charset="0"/>
                           </a:rPr>
                           <m:t>𝑁</m:t>
@@ -4863,7 +5637,7 @@
                       </m:e>
                     </m:func>
                     <m:r>
-                      <a:rPr lang="en-US" b="0" i="1" smtClean="0">
+                      <a:rPr lang="en-US" i="1">
                         <a:latin typeface="Cambria Math" panose="02040503050406030204" pitchFamily="18" charset="0"/>
                       </a:rPr>
                       <m:t>−1]</m:t>
@@ -4881,10 +5655,10 @@
         <mc:Fallback>
           <p:sp>
             <p:nvSpPr>
-              <p:cNvPr id="28" name="TextBox 27">
+              <p:cNvPr id="9" name="TextBox 8">
                 <a:extLst>
                   <a:ext uri="{FF2B5EF4-FFF2-40B4-BE49-F238E27FC236}">
-                    <a16:creationId xmlns:a16="http://schemas.microsoft.com/office/drawing/2014/main" id="{A566CE58-4583-485C-907C-5D60FDF2D1BC}"/>
+                    <a16:creationId xmlns:a16="http://schemas.microsoft.com/office/drawing/2014/main" id="{21932055-ECDE-4569-A765-5A7C563D9FD1}"/>
                   </a:ext>
                 </a:extLst>
               </p:cNvPr>
@@ -4895,7 +5669,7 @@
             </p:nvSpPr>
             <p:spPr>
               <a:xfrm>
-                <a:off x="4742411" y="2625978"/>
+                <a:off x="6586451" y="917817"/>
                 <a:ext cx="2683823" cy="1200329"/>
               </a:xfrm>
               <a:prstGeom prst="rect">
@@ -4904,7 +5678,7 @@
               <a:blipFill>
                 <a:blip r:embed="rId3"/>
                 <a:stretch>
-                  <a:fillRect t="-2513" r="-1810" b="-6533"/>
+                  <a:fillRect t="-2525" r="-1580" b="-7071"/>
                 </a:stretch>
               </a:blipFill>
               <a:ln>
@@ -4933,23 +5707,117 @@
       </mc:AlternateContent>
       <p:cxnSp>
         <p:nvCxnSpPr>
-          <p:cNvPr id="29" name="Straight Arrow Connector 28">
-            <a:extLst>
-              <a:ext uri="{FF2B5EF4-FFF2-40B4-BE49-F238E27FC236}">
-                <a16:creationId xmlns:a16="http://schemas.microsoft.com/office/drawing/2014/main" id="{960E5A00-D214-4298-81FD-8425AB4441F0}"/>
+          <p:cNvPr id="10" name="Connector: Elbow 9">
+            <a:extLst>
+              <a:ext uri="{FF2B5EF4-FFF2-40B4-BE49-F238E27FC236}">
+                <a16:creationId xmlns:a16="http://schemas.microsoft.com/office/drawing/2014/main" id="{47B2FC43-6B78-4402-AB82-2D7C9EFCDFCB}"/>
               </a:ext>
             </a:extLst>
           </p:cNvPr>
           <p:cNvCxnSpPr>
             <a:cxnSpLocks/>
-            <a:stCxn id="25" idx="2"/>
-            <a:endCxn id="28" idx="0"/>
+            <a:stCxn id="8" idx="3"/>
+            <a:endCxn id="9" idx="1"/>
+          </p:cNvCxnSpPr>
+          <p:nvPr/>
+        </p:nvCxnSpPr>
+        <p:spPr>
+          <a:xfrm flipV="1">
+            <a:off x="5597434" y="1517982"/>
+            <a:ext cx="989017" cy="3693320"/>
+          </a:xfrm>
+          <a:prstGeom prst="bentConnector3">
+            <a:avLst/>
+          </a:prstGeom>
+          <a:ln>
+            <a:tailEnd type="triangle"/>
+          </a:ln>
+        </p:spPr>
+        <p:style>
+          <a:lnRef idx="1">
+            <a:schemeClr val="dk1"/>
+          </a:lnRef>
+          <a:fillRef idx="0">
+            <a:schemeClr val="dk1"/>
+          </a:fillRef>
+          <a:effectRef idx="0">
+            <a:schemeClr val="dk1"/>
+          </a:effectRef>
+          <a:fontRef idx="minor">
+            <a:schemeClr val="tx1"/>
+          </a:fontRef>
+        </p:style>
+      </p:cxnSp>
+      <p:sp>
+        <p:nvSpPr>
+          <p:cNvPr id="11" name="TextBox 10">
+            <a:extLst>
+              <a:ext uri="{FF2B5EF4-FFF2-40B4-BE49-F238E27FC236}">
+                <a16:creationId xmlns:a16="http://schemas.microsoft.com/office/drawing/2014/main" id="{61ACCBC9-8E14-4518-8531-F0F2479B2BF3}"/>
+              </a:ext>
+            </a:extLst>
+          </p:cNvPr>
+          <p:cNvSpPr txBox="1"/>
+          <p:nvPr/>
+        </p:nvSpPr>
+        <p:spPr>
+          <a:xfrm>
+            <a:off x="6586451" y="2625978"/>
+            <a:ext cx="2683823" cy="1477328"/>
+          </a:xfrm>
+          <a:prstGeom prst="rect">
+            <a:avLst/>
+          </a:prstGeom>
+          <a:noFill/>
+          <a:ln>
+            <a:solidFill>
+              <a:schemeClr val="tx1">
+                <a:lumMod val="95000"/>
+                <a:lumOff val="5000"/>
+              </a:schemeClr>
+            </a:solidFill>
+          </a:ln>
+        </p:spPr>
+        <p:txBody>
+          <a:bodyPr wrap="square" rtlCol="0">
+            <a:spAutoFit/>
+          </a:bodyPr>
+          <a:lstStyle/>
+          <a:p>
+            <a:pPr algn="ctr"/>
+            <a:r>
+              <a:rPr lang="en-US" dirty="0"/>
+              <a:t>Take the real and imaginary parts as the output blocks, add them to the output vector</a:t>
+            </a:r>
+          </a:p>
+          <a:p>
+            <a:pPr algn="ctr"/>
+            <a:r>
+              <a:rPr lang="en-US" dirty="0"/>
+              <a:t>(No MAC operations)</a:t>
+            </a:r>
+          </a:p>
+        </p:txBody>
+      </p:sp>
+      <p:cxnSp>
+        <p:nvCxnSpPr>
+          <p:cNvPr id="12" name="Straight Arrow Connector 11">
+            <a:extLst>
+              <a:ext uri="{FF2B5EF4-FFF2-40B4-BE49-F238E27FC236}">
+                <a16:creationId xmlns:a16="http://schemas.microsoft.com/office/drawing/2014/main" id="{48071C8B-12E7-4D26-8AAA-9BE199F4A976}"/>
+              </a:ext>
+            </a:extLst>
+          </p:cNvPr>
+          <p:cNvCxnSpPr>
+            <a:cxnSpLocks/>
+            <a:stCxn id="9" idx="2"/>
+            <a:endCxn id="11" idx="0"/>
           </p:cNvCxnSpPr>
           <p:nvPr/>
         </p:nvCxnSpPr>
         <p:spPr>
           <a:xfrm>
-            <a:off x="6084323" y="2118146"/>
+            <a:off x="7928363" y="2118146"/>
             <a:ext cx="0" cy="507832"/>
           </a:xfrm>
           <a:prstGeom prst="straightConnector1">
@@ -4979,10 +5847,10 @@
       </p:cxnSp>
       <p:sp>
         <p:nvSpPr>
-          <p:cNvPr id="31" name="TextBox 30">
-            <a:extLst>
-              <a:ext uri="{FF2B5EF4-FFF2-40B4-BE49-F238E27FC236}">
-                <a16:creationId xmlns:a16="http://schemas.microsoft.com/office/drawing/2014/main" id="{29C07CD2-540F-4998-AAC2-B321071E64C0}"/>
+          <p:cNvPr id="13" name="TextBox 12">
+            <a:extLst>
+              <a:ext uri="{FF2B5EF4-FFF2-40B4-BE49-F238E27FC236}">
+                <a16:creationId xmlns:a16="http://schemas.microsoft.com/office/drawing/2014/main" id="{81299D47-A9E7-446D-B22A-9061F1BE7204}"/>
               </a:ext>
             </a:extLst>
           </p:cNvPr>
@@ -4991,8 +5859,8 @@
         </p:nvSpPr>
         <p:spPr>
           <a:xfrm>
-            <a:off x="4742409" y="4472638"/>
-            <a:ext cx="2683823" cy="1477328"/>
+            <a:off x="6586449" y="4749638"/>
+            <a:ext cx="2683823" cy="1754326"/>
           </a:xfrm>
           <a:prstGeom prst="rect">
             <a:avLst/>
@@ -5000,10 +5868,7 @@
           <a:noFill/>
           <a:ln>
             <a:solidFill>
-              <a:schemeClr val="tx1">
-                <a:lumMod val="95000"/>
-                <a:lumOff val="5000"/>
-              </a:schemeClr>
+              <a:srgbClr val="00B050"/>
             </a:solidFill>
           </a:ln>
         </p:spPr>
@@ -5015,38 +5880,34 @@
           <a:p>
             <a:pPr algn="ctr"/>
             <a:r>
-              <a:rPr lang="en-US"/>
-              <a:t>Take the real and imaginary parts as the output blocks, add them to the output vector</a:t>
+              <a:rPr lang="en-US" dirty="0"/>
+              <a:t>N-M samples of output are generated per output stream, so 2(N-M) output samples are generated total</a:t>
             </a:r>
           </a:p>
           <a:p>
             <a:pPr algn="ctr"/>
-            <a:r>
-              <a:rPr lang="en-US"/>
-              <a:t>(No MAC operations)</a:t>
-            </a:r>
             <a:endParaRPr lang="en-US" dirty="0"/>
           </a:p>
         </p:txBody>
       </p:sp>
       <p:cxnSp>
         <p:nvCxnSpPr>
-          <p:cNvPr id="32" name="Straight Arrow Connector 31">
-            <a:extLst>
-              <a:ext uri="{FF2B5EF4-FFF2-40B4-BE49-F238E27FC236}">
-                <a16:creationId xmlns:a16="http://schemas.microsoft.com/office/drawing/2014/main" id="{252979BE-19F7-411C-9DEC-9324E3DA44D3}"/>
+          <p:cNvPr id="14" name="Straight Arrow Connector 13">
+            <a:extLst>
+              <a:ext uri="{FF2B5EF4-FFF2-40B4-BE49-F238E27FC236}">
+                <a16:creationId xmlns:a16="http://schemas.microsoft.com/office/drawing/2014/main" id="{1250FF02-E810-457A-A6C5-7056891290D3}"/>
               </a:ext>
             </a:extLst>
           </p:cNvPr>
           <p:cNvCxnSpPr>
             <a:cxnSpLocks/>
-            <a:endCxn id="31" idx="0"/>
+            <a:endCxn id="13" idx="0"/>
           </p:cNvCxnSpPr>
           <p:nvPr/>
         </p:nvCxnSpPr>
         <p:spPr>
           <a:xfrm>
-            <a:off x="6084320" y="3826307"/>
+            <a:off x="7928360" y="4103307"/>
             <a:ext cx="1" cy="646331"/>
           </a:xfrm>
           <a:prstGeom prst="straightConnector1">
@@ -5076,93 +5937,10 @@
       </p:cxnSp>
       <p:sp>
         <p:nvSpPr>
-          <p:cNvPr id="35" name="TextBox 34">
-            <a:extLst>
-              <a:ext uri="{FF2B5EF4-FFF2-40B4-BE49-F238E27FC236}">
-                <a16:creationId xmlns:a16="http://schemas.microsoft.com/office/drawing/2014/main" id="{B4C9F7E0-A5E1-4321-BAF4-FF4632495967}"/>
-              </a:ext>
-            </a:extLst>
-          </p:cNvPr>
-          <p:cNvSpPr txBox="1"/>
-          <p:nvPr/>
-        </p:nvSpPr>
-        <p:spPr>
-          <a:xfrm>
-            <a:off x="8415251" y="779318"/>
-            <a:ext cx="2683823" cy="1477328"/>
-          </a:xfrm>
-          <a:prstGeom prst="rect">
-            <a:avLst/>
-          </a:prstGeom>
-          <a:noFill/>
-          <a:ln>
-            <a:solidFill>
-              <a:srgbClr val="00B050"/>
-            </a:solidFill>
-          </a:ln>
-        </p:spPr>
-        <p:txBody>
-          <a:bodyPr wrap="square" rtlCol="0">
-            <a:spAutoFit/>
-          </a:bodyPr>
-          <a:lstStyle/>
-          <a:p>
-            <a:pPr algn="ctr"/>
-            <a:r>
-              <a:rPr lang="en-US" dirty="0"/>
-              <a:t>N-M samples of output are generated per output stream, so 2(N-M) output samples are generated total</a:t>
-            </a:r>
-          </a:p>
-        </p:txBody>
-      </p:sp>
-      <p:cxnSp>
-        <p:nvCxnSpPr>
-          <p:cNvPr id="40" name="Connector: Elbow 39">
-            <a:extLst>
-              <a:ext uri="{FF2B5EF4-FFF2-40B4-BE49-F238E27FC236}">
-                <a16:creationId xmlns:a16="http://schemas.microsoft.com/office/drawing/2014/main" id="{6D6A634D-164E-4061-A4A4-F52833CFDB12}"/>
-              </a:ext>
-            </a:extLst>
-          </p:cNvPr>
-          <p:cNvCxnSpPr>
-            <a:stCxn id="31" idx="3"/>
-            <a:endCxn id="35" idx="1"/>
-          </p:cNvCxnSpPr>
-          <p:nvPr/>
-        </p:nvCxnSpPr>
-        <p:spPr>
-          <a:xfrm flipV="1">
-            <a:off x="7426232" y="1517982"/>
-            <a:ext cx="989019" cy="3693320"/>
-          </a:xfrm>
-          <a:prstGeom prst="bentConnector3">
-            <a:avLst/>
-          </a:prstGeom>
-          <a:ln>
-            <a:tailEnd type="triangle"/>
-          </a:ln>
-        </p:spPr>
-        <p:style>
-          <a:lnRef idx="1">
-            <a:schemeClr val="dk1"/>
-          </a:lnRef>
-          <a:fillRef idx="0">
-            <a:schemeClr val="dk1"/>
-          </a:fillRef>
-          <a:effectRef idx="0">
-            <a:schemeClr val="dk1"/>
-          </a:effectRef>
-          <a:fontRef idx="minor">
-            <a:schemeClr val="tx1"/>
-          </a:fontRef>
-        </p:style>
-      </p:cxnSp>
-      <p:sp>
-        <p:nvSpPr>
-          <p:cNvPr id="41" name="TextBox 40">
-            <a:extLst>
-              <a:ext uri="{FF2B5EF4-FFF2-40B4-BE49-F238E27FC236}">
-                <a16:creationId xmlns:a16="http://schemas.microsoft.com/office/drawing/2014/main" id="{60FA1BA0-9362-43FD-9AFF-EAE9FF1FA4AB}"/>
+          <p:cNvPr id="17" name="TextBox 16">
+            <a:extLst>
+              <a:ext uri="{FF2B5EF4-FFF2-40B4-BE49-F238E27FC236}">
+                <a16:creationId xmlns:a16="http://schemas.microsoft.com/office/drawing/2014/main" id="{B601C822-5ECC-47A8-B944-BEB426FFB5BC}"/>
               </a:ext>
             </a:extLst>
           </p:cNvPr>
@@ -5196,7 +5974,7 @@
     </p:spTree>
     <p:extLst>
       <p:ext uri="{BB962C8B-B14F-4D97-AF65-F5344CB8AC3E}">
-        <p14:creationId xmlns:p14="http://schemas.microsoft.com/office/powerpoint/2010/main" val="760144086"/>
+        <p14:creationId xmlns:p14="http://schemas.microsoft.com/office/powerpoint/2010/main" val="1644059822"/>
       </p:ext>
     </p:extLst>
   </p:cSld>

</xml_diff>